<commit_message>
Improved model export by adding ODS format
</commit_message>
<xml_diff>
--- a/doc/genome_scale_pipeline/CGM_overview.pptx
+++ b/doc/genome_scale_pipeline/CGM_overview.pptx
@@ -4754,12 +4754,48 @@
           </a:p>
         </p:txBody>
       </p:sp>
+      <p:sp>
+        <p:nvSpPr>
+          <p:cNvPr id="2" name="ZoneTexte 1">
+            <a:extLst>
+              <a:ext uri="{FF2B5EF4-FFF2-40B4-BE49-F238E27FC236}">
+                <a16:creationId xmlns:a16="http://schemas.microsoft.com/office/drawing/2014/main" id="{A65555E6-BC03-92E9-CC0B-4E26F53CAED2}"/>
+              </a:ext>
+            </a:extLst>
+          </p:cNvPr>
+          <p:cNvSpPr txBox="1"/>
+          <p:nvPr/>
+        </p:nvSpPr>
+        <p:spPr>
+          <a:xfrm>
+            <a:off x="2235999" y="4815363"/>
+            <a:ext cx="1297664" cy="369332"/>
+          </a:xfrm>
+          <a:prstGeom prst="rect">
+            <a:avLst/>
+          </a:prstGeom>
+          <a:noFill/>
+        </p:spPr>
+        <p:txBody>
+          <a:bodyPr wrap="none" rtlCol="0">
+            <a:spAutoFit/>
+          </a:bodyPr>
+          <a:lstStyle/>
+          <a:p>
+            <a:pPr algn="ctr"/>
+            <a:r>
+              <a:rPr lang="fr-FR"/>
+              <a:t>MMSYN_v1</a:t>
+            </a:r>
+          </a:p>
+        </p:txBody>
+      </p:sp>
       <p:pic>
         <p:nvPicPr>
-          <p:cNvPr id="1026" name="Picture 2" descr="Symbole de format de fichier odt - Icônes interface gratuites">
-            <a:extLst>
-              <a:ext uri="{FF2B5EF4-FFF2-40B4-BE49-F238E27FC236}">
-                <a16:creationId xmlns:a16="http://schemas.microsoft.com/office/drawing/2014/main" id="{650F999B-97D2-C20B-285A-60A567244A2D}"/>
+          <p:cNvPr id="3" name="Picture 2" descr="Symbole de format de fichier ods - Icônes interface gratuites">
+            <a:extLst>
+              <a:ext uri="{FF2B5EF4-FFF2-40B4-BE49-F238E27FC236}">
+                <a16:creationId xmlns:a16="http://schemas.microsoft.com/office/drawing/2014/main" id="{0EE6F2D7-16B8-BBAF-C893-DC43CED14683}"/>
               </a:ext>
             </a:extLst>
           </p:cNvPr>
@@ -4783,7 +4819,7 @@
         </p:blipFill>
         <p:spPr bwMode="auto">
           <a:xfrm>
-            <a:off x="2555693" y="4169586"/>
+            <a:off x="2558351" y="4175283"/>
             <a:ext cx="645777" cy="645777"/>
           </a:xfrm>
           <a:prstGeom prst="rect">
@@ -4801,42 +4837,6 @@
           </a:extLst>
         </p:spPr>
       </p:pic>
-      <p:sp>
-        <p:nvSpPr>
-          <p:cNvPr id="2" name="ZoneTexte 1">
-            <a:extLst>
-              <a:ext uri="{FF2B5EF4-FFF2-40B4-BE49-F238E27FC236}">
-                <a16:creationId xmlns:a16="http://schemas.microsoft.com/office/drawing/2014/main" id="{A65555E6-BC03-92E9-CC0B-4E26F53CAED2}"/>
-              </a:ext>
-            </a:extLst>
-          </p:cNvPr>
-          <p:cNvSpPr txBox="1"/>
-          <p:nvPr/>
-        </p:nvSpPr>
-        <p:spPr>
-          <a:xfrm>
-            <a:off x="2235999" y="4815363"/>
-            <a:ext cx="1297664" cy="369332"/>
-          </a:xfrm>
-          <a:prstGeom prst="rect">
-            <a:avLst/>
-          </a:prstGeom>
-          <a:noFill/>
-        </p:spPr>
-        <p:txBody>
-          <a:bodyPr wrap="none" rtlCol="0">
-            <a:spAutoFit/>
-          </a:bodyPr>
-          <a:lstStyle/>
-          <a:p>
-            <a:pPr algn="ctr"/>
-            <a:r>
-              <a:rPr lang="fr-FR"/>
-              <a:t>MMSYN_v1</a:t>
-            </a:r>
-          </a:p>
-        </p:txBody>
-      </p:sp>
     </p:spTree>
     <p:extLst>
       <p:ext uri="{BB962C8B-B14F-4D97-AF65-F5344CB8AC3E}">

</xml_diff>

<commit_message>
Improved copyrights and licensing + Renamed MMSYN tutorial into MMSYN_CGM
</commit_message>
<xml_diff>
--- a/doc/genome_scale_pipeline/CGM_overview.pptx
+++ b/doc/genome_scale_pipeline/CGM_overview.pptx
@@ -196,7 +196,7 @@
           </a:lstStyle>
           <a:p>
             <a:fld id="{49500105-9C48-984E-9CDC-F1375D25D7E6}" type="datetimeFigureOut">
-              <a:t>26/06/2025</a:t>
+              <a:t>16/07/2025</a:t>
             </a:fld>
             <a:endParaRPr lang="fr-FR"/>
           </a:p>
@@ -608,7 +608,7 @@
           <a:lstStyle/>
           <a:p>
             <a:fld id="{7017F4CF-FB7D-E643-B991-A4BE8CDC438F}" type="datetimeFigureOut">
-              <a:t>26/06/2025</a:t>
+              <a:t>16/07/2025</a:t>
             </a:fld>
             <a:endParaRPr lang="fr-FR"/>
           </a:p>
@@ -804,7 +804,7 @@
           <a:lstStyle/>
           <a:p>
             <a:fld id="{7017F4CF-FB7D-E643-B991-A4BE8CDC438F}" type="datetimeFigureOut">
-              <a:t>26/06/2025</a:t>
+              <a:t>16/07/2025</a:t>
             </a:fld>
             <a:endParaRPr lang="fr-FR"/>
           </a:p>
@@ -1010,7 +1010,7 @@
           <a:lstStyle/>
           <a:p>
             <a:fld id="{7017F4CF-FB7D-E643-B991-A4BE8CDC438F}" type="datetimeFigureOut">
-              <a:t>26/06/2025</a:t>
+              <a:t>16/07/2025</a:t>
             </a:fld>
             <a:endParaRPr lang="fr-FR"/>
           </a:p>
@@ -1206,7 +1206,7 @@
           <a:lstStyle/>
           <a:p>
             <a:fld id="{7017F4CF-FB7D-E643-B991-A4BE8CDC438F}" type="datetimeFigureOut">
-              <a:t>26/06/2025</a:t>
+              <a:t>16/07/2025</a:t>
             </a:fld>
             <a:endParaRPr lang="fr-FR"/>
           </a:p>
@@ -1479,7 +1479,7 @@
           <a:lstStyle/>
           <a:p>
             <a:fld id="{7017F4CF-FB7D-E643-B991-A4BE8CDC438F}" type="datetimeFigureOut">
-              <a:t>26/06/2025</a:t>
+              <a:t>16/07/2025</a:t>
             </a:fld>
             <a:endParaRPr lang="fr-FR"/>
           </a:p>
@@ -1742,7 +1742,7 @@
           <a:lstStyle/>
           <a:p>
             <a:fld id="{7017F4CF-FB7D-E643-B991-A4BE8CDC438F}" type="datetimeFigureOut">
-              <a:t>26/06/2025</a:t>
+              <a:t>16/07/2025</a:t>
             </a:fld>
             <a:endParaRPr lang="fr-FR"/>
           </a:p>
@@ -2152,7 +2152,7 @@
           <a:lstStyle/>
           <a:p>
             <a:fld id="{7017F4CF-FB7D-E643-B991-A4BE8CDC438F}" type="datetimeFigureOut">
-              <a:t>26/06/2025</a:t>
+              <a:t>16/07/2025</a:t>
             </a:fld>
             <a:endParaRPr lang="fr-FR"/>
           </a:p>
@@ -2291,7 +2291,7 @@
           <a:lstStyle/>
           <a:p>
             <a:fld id="{7017F4CF-FB7D-E643-B991-A4BE8CDC438F}" type="datetimeFigureOut">
-              <a:t>26/06/2025</a:t>
+              <a:t>16/07/2025</a:t>
             </a:fld>
             <a:endParaRPr lang="fr-FR"/>
           </a:p>
@@ -2402,7 +2402,7 @@
           <a:lstStyle/>
           <a:p>
             <a:fld id="{7017F4CF-FB7D-E643-B991-A4BE8CDC438F}" type="datetimeFigureOut">
-              <a:t>26/06/2025</a:t>
+              <a:t>16/07/2025</a:t>
             </a:fld>
             <a:endParaRPr lang="fr-FR"/>
           </a:p>
@@ -2711,7 +2711,7 @@
           <a:lstStyle/>
           <a:p>
             <a:fld id="{7017F4CF-FB7D-E643-B991-A4BE8CDC438F}" type="datetimeFigureOut">
-              <a:t>26/06/2025</a:t>
+              <a:t>16/07/2025</a:t>
             </a:fld>
             <a:endParaRPr lang="fr-FR"/>
           </a:p>
@@ -2997,7 +2997,7 @@
           <a:lstStyle/>
           <a:p>
             <a:fld id="{7017F4CF-FB7D-E643-B991-A4BE8CDC438F}" type="datetimeFigureOut">
-              <a:t>26/06/2025</a:t>
+              <a:t>16/07/2025</a:t>
             </a:fld>
             <a:endParaRPr lang="fr-FR"/>
           </a:p>
@@ -3236,7 +3236,7 @@
           </a:lstStyle>
           <a:p>
             <a:fld id="{7017F4CF-FB7D-E643-B991-A4BE8CDC438F}" type="datetimeFigureOut">
-              <a:t>26/06/2025</a:t>
+              <a:t>16/07/2025</a:t>
             </a:fld>
             <a:endParaRPr lang="fr-FR"/>
           </a:p>
@@ -3755,10 +3755,10 @@
         </p:nvGrpSpPr>
         <p:grpSpPr>
           <a:xfrm>
-            <a:off x="2237563" y="3184742"/>
-            <a:ext cx="1297664" cy="891695"/>
-            <a:chOff x="3739200" y="1897888"/>
-            <a:chExt cx="1297664" cy="891695"/>
+            <a:off x="1714247" y="3239172"/>
+            <a:ext cx="1908857" cy="891695"/>
+            <a:chOff x="3433604" y="1897888"/>
+            <a:chExt cx="1908857" cy="891695"/>
           </a:xfrm>
         </p:grpSpPr>
         <p:pic>
@@ -3822,8 +3822,8 @@
           </p:nvSpPr>
           <p:spPr>
             <a:xfrm>
-              <a:off x="3739200" y="2420251"/>
-              <a:ext cx="1297664" cy="369332"/>
+              <a:off x="3433604" y="2420251"/>
+              <a:ext cx="1908857" cy="369332"/>
             </a:xfrm>
             <a:prstGeom prst="rect">
               <a:avLst/>
@@ -3839,7 +3839,7 @@
               <a:pPr algn="ctr"/>
               <a:r>
                 <a:rPr lang="fr-FR"/>
-                <a:t>MMSYN_v1</a:t>
+                <a:t>MMSYN_CGM_v1</a:t>
               </a:r>
             </a:p>
           </p:txBody>
@@ -4768,8 +4768,8 @@
         </p:nvSpPr>
         <p:spPr>
           <a:xfrm>
-            <a:off x="2235999" y="4815363"/>
-            <a:ext cx="1297664" cy="369332"/>
+            <a:off x="1712683" y="4869793"/>
+            <a:ext cx="1908857" cy="369332"/>
           </a:xfrm>
           <a:prstGeom prst="rect">
             <a:avLst/>
@@ -4785,7 +4785,7 @@
             <a:pPr algn="ctr"/>
             <a:r>
               <a:rPr lang="fr-FR"/>
-              <a:t>MMSYN_v1</a:t>
+              <a:t>MMSYN_CGM_v1</a:t>
             </a:r>
           </a:p>
         </p:txBody>
@@ -4819,7 +4819,7 @@
         </p:blipFill>
         <p:spPr bwMode="auto">
           <a:xfrm>
-            <a:off x="2558351" y="4175283"/>
+            <a:off x="2340631" y="4229713"/>
             <a:ext cx="645777" cy="645777"/>
           </a:xfrm>
           <a:prstGeom prst="rect">

</xml_diff>